<commit_message>
Updated overview slide deck
</commit_message>
<xml_diff>
--- a/Presentation-AWS-NLP-workshop.pptx
+++ b/Presentation-AWS-NLP-workshop.pptx
@@ -4014,7 +4014,7 @@
             <a:fld id="{0B25AC41-3BEC-9247-8322-91B80C013F2D}" type="datetimeFigureOut">
               <a:rPr lang="en-US" smtClean="0"/>
               <a:pPr/>
-              <a:t>6/29/18</a:t>
+              <a:t>8/16/18</a:t>
             </a:fld>
             <a:endParaRPr lang="en-US" dirty="0"/>
           </a:p>
@@ -9104,6 +9104,16 @@
             </a:pPr>
             <a:r>
               <a:rPr lang="en-US" sz="2000" dirty="0"/>
+              <a:t>Deploy the application using CloudFormation – 15 mins</a:t>
+            </a:r>
+          </a:p>
+          <a:p>
+            <a:pPr marL="342900" indent="-342900">
+              <a:buFont typeface="Arial" panose="020B0604020202020204" pitchFamily="34" charset="0"/>
+              <a:buChar char="•"/>
+            </a:pPr>
+            <a:r>
+              <a:rPr lang="en-US" sz="2000" dirty="0"/>
               <a:t>Amazon Comprehend – 30 mins</a:t>
             </a:r>
           </a:p>
@@ -9114,7 +9124,15 @@
             </a:pPr>
             <a:r>
               <a:rPr lang="en-US" sz="2000" dirty="0"/>
-              <a:t>Amazon Sagemaker model training – 60 min (minimum)</a:t>
+              <a:t>Amazon </a:t>
+            </a:r>
+            <a:r>
+              <a:rPr lang="en-US" sz="2000" dirty="0" err="1"/>
+              <a:t>Sagemaker</a:t>
+            </a:r>
+            <a:r>
+              <a:rPr lang="en-US" sz="2000" dirty="0"/>
+              <a:t> Model Training – 30 min </a:t>
             </a:r>
           </a:p>
           <a:p>
@@ -9124,25 +9142,16 @@
             </a:pPr>
             <a:r>
               <a:rPr lang="en-US" sz="2000" dirty="0"/>
-              <a:t>Amazon Sagemaker Deployment – 25 mins</a:t>
+              <a:t>Amazon </a:t>
             </a:r>
-          </a:p>
-          <a:p>
-            <a:pPr marL="342900" indent="-342900">
-              <a:buFont typeface="Arial" panose="020B0604020202020204" pitchFamily="34" charset="0"/>
-              <a:buChar char="•"/>
-            </a:pPr>
+            <a:r>
+              <a:rPr lang="en-US" sz="2000" dirty="0" err="1"/>
+              <a:t>Sagemaker</a:t>
+            </a:r>
             <a:r>
               <a:rPr lang="en-US" sz="2000" dirty="0"/>
-              <a:t>Additional : Deploy the application using CloudFormation</a:t>
+              <a:t> Model Deployment – 30 mins</a:t>
             </a:r>
-          </a:p>
-          <a:p>
-            <a:pPr marL="342900" indent="-342900">
-              <a:buFont typeface="Arial" panose="020B0604020202020204" pitchFamily="34" charset="0"/>
-              <a:buChar char="•"/>
-            </a:pPr>
-            <a:endParaRPr lang="en-US" sz="2000" dirty="0"/>
           </a:p>
           <a:p>
             <a:pPr marL="342900" indent="-342900">
@@ -25687,7 +25696,7 @@
         <p:spPr>
           <a:xfrm>
             <a:off x="1861865" y="231618"/>
-            <a:ext cx="5425199" cy="3154520"/>
+            <a:ext cx="5425199" cy="3380262"/>
           </a:xfrm>
         </p:spPr>
         <p:txBody>
@@ -25709,9 +25718,9 @@
               <a:rPr lang="en-US" sz="2000" dirty="0">
                 <a:hlinkClick r:id="rId2"/>
               </a:rPr>
-              <a:t>https://github.com/</a:t>
+              <a:t>https://github.com/aws-samples/aws-nlp-workshop</a:t>
             </a:r>
-            <a:endParaRPr lang="en-US" sz="2000" b="1" dirty="0"/>
+            <a:endParaRPr lang="en-US" sz="2000" dirty="0"/>
           </a:p>
           <a:p>
             <a:pPr algn="ctr"/>
@@ -26435,6 +26444,15 @@
 </file>
 
 <file path=customXml/item2.xml><?xml version="1.0" encoding="utf-8"?>
+<?mso-contentType ?>
+<FormTemplates xmlns="http://schemas.microsoft.com/sharepoint/v3/contenttype/forms">
+  <Display>DocumentLibraryForm</Display>
+  <Edit>DocumentLibraryForm</Edit>
+  <New>DocumentLibraryForm</New>
+</FormTemplates>
+</file>
+
+<file path=customXml/item3.xml><?xml version="1.0" encoding="utf-8"?>
 <ct:contentTypeSchema xmlns:ct="http://schemas.microsoft.com/office/2006/metadata/contentType" xmlns:ma="http://schemas.microsoft.com/office/2006/metadata/properties/metaAttributes" ct:_="" ma:_="" ma:contentTypeName="Document" ma:contentTypeID="0x010100D26A3D6C04DFD740953BA1B2B9E62D60" ma:contentTypeVersion="0" ma:contentTypeDescription="Create a new document." ma:contentTypeScope="" ma:versionID="26617cd14cd3af163c0e97ff614e520a">
   <xsd:schema xmlns:xsd="http://www.w3.org/2001/XMLSchema" xmlns:xs="http://www.w3.org/2001/XMLSchema" xmlns:p="http://schemas.microsoft.com/office/2006/metadata/properties" targetNamespace="http://schemas.microsoft.com/office/2006/metadata/properties" ma:root="true" ma:fieldsID="c64490b4aec6201516c3a874156f37b2">
     <xsd:element name="properties">
@@ -26548,15 +26566,6 @@
 </ct:contentTypeSchema>
 </file>
 
-<file path=customXml/item3.xml><?xml version="1.0" encoding="utf-8"?>
-<?mso-contentType ?>
-<FormTemplates xmlns="http://schemas.microsoft.com/sharepoint/v3/contenttype/forms">
-  <Display>DocumentLibraryForm</Display>
-  <Edit>DocumentLibraryForm</Edit>
-  <New>DocumentLibraryForm</New>
-</FormTemplates>
-</file>
-
 <file path=customXml/itemProps1.xml><?xml version="1.0" encoding="utf-8"?>
 <ds:datastoreItem xmlns:ds="http://schemas.openxmlformats.org/officeDocument/2006/customXml" ds:itemID="{C597C89A-FD0C-431E-81F6-90225B937683}">
   <ds:schemaRefs>
@@ -26573,6 +26582,14 @@
 </file>
 
 <file path=customXml/itemProps2.xml><?xml version="1.0" encoding="utf-8"?>
+<ds:datastoreItem xmlns:ds="http://schemas.openxmlformats.org/officeDocument/2006/customXml" ds:itemID="{705B35A6-8B52-46A5-AE45-B98C6459DC10}">
+  <ds:schemaRefs>
+    <ds:schemaRef ds:uri="http://schemas.microsoft.com/sharepoint/v3/contenttype/forms"/>
+  </ds:schemaRefs>
+</ds:datastoreItem>
+</file>
+
+<file path=customXml/itemProps3.xml><?xml version="1.0" encoding="utf-8"?>
 <ds:datastoreItem xmlns:ds="http://schemas.openxmlformats.org/officeDocument/2006/customXml" ds:itemID="{51A3258A-222C-4488-825E-7520D001FB75}">
   <ds:schemaRefs>
     <ds:schemaRef ds:uri="http://schemas.microsoft.com/office/2006/metadata/contentType"/>
@@ -26586,12 +26603,4 @@
     <ds:schemaRef ds:uri="http://schemas.microsoft.com/office/infopath/2007/PartnerControls"/>
   </ds:schemaRefs>
 </ds:datastoreItem>
-</file>
-
-<file path=customXml/itemProps3.xml><?xml version="1.0" encoding="utf-8"?>
-<ds:datastoreItem xmlns:ds="http://schemas.openxmlformats.org/officeDocument/2006/customXml" ds:itemID="{705B35A6-8B52-46A5-AE45-B98C6459DC10}">
-  <ds:schemaRefs>
-    <ds:schemaRef ds:uri="http://schemas.microsoft.com/sharepoint/v3/contenttype/forms"/>
-  </ds:schemaRefs>
-</ds:datastoreItem>
 </file>
</xml_diff>